<commit_message>
Final updates from live session
</commit_message>
<xml_diff>
--- a/Slides/01 - Introduction to Entity Framework.pptx
+++ b/Slides/01 - Introduction to Entity Framework.pptx
@@ -3108,50 +3108,6 @@
           <a:bodyPr/>
           <a:lstStyle/>
           <a:p>
-            <a:r>
-              <a:rPr lang="en-US" dirty="0" smtClean="0"/>
-              <a:t>Connection string can be double slash</a:t>
-            </a:r>
-          </a:p>
-          <a:p>
-            <a:r>
-              <a:rPr lang="en-US" dirty="0" smtClean="0"/>
-              <a:t>"Data Source=(</a:t>
-            </a:r>
-            <a:r>
-              <a:rPr lang="en-US" dirty="0" err="1" smtClean="0"/>
-              <a:t>localdb</a:t>
-            </a:r>
-            <a:r>
-              <a:rPr lang="en-US" dirty="0" smtClean="0"/>
-              <a:t>)\\</a:t>
-            </a:r>
-            <a:r>
-              <a:rPr lang="en-US" dirty="0" err="1" smtClean="0"/>
-              <a:t>mssqllocaldb;Initial</a:t>
-            </a:r>
-            <a:r>
-              <a:rPr lang="en-US" dirty="0" smtClean="0"/>
-              <a:t> Catalog=</a:t>
-            </a:r>
-            <a:r>
-              <a:rPr lang="en-US" dirty="0" err="1" smtClean="0"/>
-              <a:t>MusicStoreConnection;Integrated</a:t>
-            </a:r>
-            <a:r>
-              <a:rPr lang="en-US" dirty="0" smtClean="0"/>
-              <a:t> Security=</a:t>
-            </a:r>
-            <a:r>
-              <a:rPr lang="en-US" dirty="0" err="1" smtClean="0"/>
-              <a:t>True;MultipleActiveResultSets</a:t>
-            </a:r>
-            <a:r>
-              <a:rPr lang="en-US" dirty="0" smtClean="0"/>
-              <a:t>=True“</a:t>
-            </a:r>
-          </a:p>
-          <a:p>
             <a:endParaRPr lang="en-US" dirty="0"/>
           </a:p>
         </p:txBody>
@@ -5748,17 +5704,17 @@
   <p:extLst mod="1">
     <p:ext uri="{DCECCB84-F9BA-43D5-87BE-67443E8EF086}">
       <p15:sldGuideLst xmlns:p15="http://schemas.microsoft.com/office/powerpoint/2012/main">
-        <p15:guide id="4294967295" orient="horz" pos="3792">
+        <p15:guide id="1" orient="horz" pos="3792">
           <p15:clr>
             <a:srgbClr val="FBAE40"/>
           </p15:clr>
         </p15:guide>
-        <p15:guide id="4294967295" pos="3839">
+        <p15:guide id="2" pos="3839">
           <p15:clr>
             <a:srgbClr val="FBAE40"/>
           </p15:clr>
         </p15:guide>
-        <p15:guide id="4294967295" orient="horz" pos="720">
+        <p15:guide id="3" orient="horz" pos="720">
           <p15:clr>
             <a:srgbClr val="FBAE40"/>
           </p15:clr>
@@ -15976,11 +15932,11 @@
   <p:clrMapOvr>
     <a:masterClrMapping/>
   </p:clrMapOvr>
-  <mc:AlternateContent xmlns:mc="http://schemas.openxmlformats.org/markup-compatibility/2006">
-    <mc:Choice xmlns:p14="http://schemas.microsoft.com/office/powerpoint/2010/main" Requires="p14">
+  <mc:AlternateContent xmlns:mc="http://schemas.openxmlformats.org/markup-compatibility/2006" xmlns:p14="http://schemas.microsoft.com/office/powerpoint/2010/main">
+    <mc:Choice Requires="p14">
       <p:transition spd="slow" p14:dur="2000"/>
     </mc:Choice>
-    <mc:Fallback>
+    <mc:Fallback xmlns="">
       <p:transition spd="slow"/>
     </mc:Fallback>
   </mc:AlternateContent>
@@ -18415,7 +18371,26 @@
             </a:r>
             <a:r>
               <a:rPr lang="en-US" dirty="0" smtClean="0"/>
-              <a:t>via </a:t>
+              <a:t>/ instances via </a:t>
+            </a:r>
+          </a:p>
+          <a:p>
+            <a:pPr lvl="1"/>
+            <a:r>
+              <a:rPr lang="en-US" dirty="0" err="1" smtClean="0">
+                <a:solidFill>
+                  <a:schemeClr val="accent1"/>
+                </a:solidFill>
+              </a:rPr>
+              <a:t>sqllocaldb</a:t>
+            </a:r>
+            <a:r>
+              <a:rPr lang="en-US" dirty="0" smtClean="0">
+                <a:solidFill>
+                  <a:schemeClr val="accent1"/>
+                </a:solidFill>
+              </a:rPr>
+              <a:t> </a:t>
             </a:r>
             <a:r>
               <a:rPr lang="en-US" dirty="0">
@@ -18423,15 +18398,39 @@
                   <a:schemeClr val="accent1"/>
                 </a:solidFill>
               </a:rPr>
-              <a:t>sqllocaldb.exe </a:t>
-            </a:r>
+              <a:t>i</a:t>
+            </a:r>
+            <a:endParaRPr lang="en-US" dirty="0" smtClean="0">
+              <a:solidFill>
+                <a:schemeClr val="accent1"/>
+              </a:solidFill>
+            </a:endParaRPr>
+          </a:p>
+          <a:p>
+            <a:pPr lvl="1"/>
             <a:r>
               <a:rPr lang="en-US" dirty="0" err="1">
                 <a:solidFill>
                   <a:schemeClr val="accent1"/>
                 </a:solidFill>
               </a:rPr>
-              <a:t>i</a:t>
+              <a:t>s</a:t>
+            </a:r>
+            <a:r>
+              <a:rPr lang="en-US" dirty="0" err="1" smtClean="0">
+                <a:solidFill>
+                  <a:schemeClr val="accent1"/>
+                </a:solidFill>
+              </a:rPr>
+              <a:t>qllocaldb</a:t>
+            </a:r>
+            <a:r>
+              <a:rPr lang="en-US" dirty="0" smtClean="0">
+                <a:solidFill>
+                  <a:schemeClr val="accent1"/>
+                </a:solidFill>
+              </a:rPr>
+              <a:t> v</a:t>
             </a:r>
             <a:endParaRPr lang="en-US" dirty="0" smtClean="0">
               <a:solidFill>
@@ -18588,8 +18587,8 @@
               <a:t>install-package </a:t>
             </a:r>
             <a:r>
-              <a:rPr lang="en-US" dirty="0" err="1"/>
-              <a:t>glimpse.entityframework</a:t>
+              <a:rPr lang="en-US" dirty="0" smtClean="0"/>
+              <a:t>glimpse.ef6</a:t>
             </a:r>
             <a:endParaRPr lang="en-US" dirty="0"/>
           </a:p>
@@ -18611,6 +18610,104 @@
               <a:t>config</a:t>
             </a:r>
             <a:endParaRPr lang="en-US" dirty="0" smtClean="0"/>
+          </a:p>
+        </p:txBody>
+      </p:sp>
+      <p:sp>
+        <p:nvSpPr>
+          <p:cNvPr id="4" name="TextBox 3"/>
+          <p:cNvSpPr txBox="1"/>
+          <p:nvPr/>
+        </p:nvSpPr>
+        <p:spPr>
+          <a:xfrm>
+            <a:off x="4082902" y="3873203"/>
+            <a:ext cx="7821044" cy="3139321"/>
+          </a:xfrm>
+          <a:prstGeom prst="rect">
+            <a:avLst/>
+          </a:prstGeom>
+          <a:noFill/>
+        </p:spPr>
+        <p:txBody>
+          <a:bodyPr wrap="square" rtlCol="0">
+            <a:spAutoFit/>
+          </a:bodyPr>
+          <a:lstStyle/>
+          <a:p>
+            <a:r>
+              <a:rPr lang="en-US" dirty="0"/>
+              <a:t>&lt;interceptors&gt;</a:t>
+            </a:r>
+          </a:p>
+          <a:p>
+            <a:r>
+              <a:rPr lang="en-US" dirty="0"/>
+              <a:t>  &lt;interceptor type="</a:t>
+            </a:r>
+            <a:r>
+              <a:rPr lang="en-US" dirty="0" err="1"/>
+              <a:t>System.Data.Entity.Infrastructure.Interception.DatabaseLogger</a:t>
+            </a:r>
+            <a:r>
+              <a:rPr lang="en-US" dirty="0"/>
+              <a:t>, </a:t>
+            </a:r>
+            <a:r>
+              <a:rPr lang="en-US" dirty="0" err="1"/>
+              <a:t>EntityFramework</a:t>
+            </a:r>
+            <a:r>
+              <a:rPr lang="en-US" dirty="0"/>
+              <a:t>"&gt;</a:t>
+            </a:r>
+          </a:p>
+          <a:p>
+            <a:r>
+              <a:rPr lang="en-US" dirty="0"/>
+              <a:t>    &lt;parameters&gt;</a:t>
+            </a:r>
+          </a:p>
+          <a:p>
+            <a:r>
+              <a:rPr lang="en-US" dirty="0"/>
+              <a:t>      &lt;parameter value=“MyAppsOutput.txt"/&gt;</a:t>
+            </a:r>
+          </a:p>
+          <a:p>
+            <a:r>
+              <a:rPr lang="en-US" dirty="0"/>
+              <a:t>      &lt;parameter value="true" type="</a:t>
+            </a:r>
+            <a:r>
+              <a:rPr lang="en-US" dirty="0" err="1"/>
+              <a:t>System.Boolean</a:t>
+            </a:r>
+            <a:r>
+              <a:rPr lang="en-US" dirty="0"/>
+              <a:t>"/&gt;</a:t>
+            </a:r>
+          </a:p>
+          <a:p>
+            <a:r>
+              <a:rPr lang="en-US" dirty="0"/>
+              <a:t>    &lt;/parameters&gt;</a:t>
+            </a:r>
+          </a:p>
+          <a:p>
+            <a:r>
+              <a:rPr lang="en-US" dirty="0"/>
+              <a:t>  &lt;/interceptor&gt;</a:t>
+            </a:r>
+          </a:p>
+          <a:p>
+            <a:r>
+              <a:rPr lang="en-US" dirty="0"/>
+              <a:t>&lt;/interceptors&gt;</a:t>
+            </a:r>
+          </a:p>
+          <a:p>
+            <a:endParaRPr lang="en-US" dirty="0"/>
           </a:p>
         </p:txBody>
       </p:sp>
@@ -18627,9 +18724,401 @@
   <p:timing>
     <p:tnLst>
       <p:par>
-        <p:cTn id="1" dur="indefinite" restart="never" nodeType="tmRoot"/>
+        <p:cTn id="1" dur="indefinite" restart="never" nodeType="tmRoot">
+          <p:childTnLst>
+            <p:seq concurrent="1" nextAc="seek">
+              <p:cTn id="2" dur="indefinite" nodeType="mainSeq">
+                <p:childTnLst>
+                  <p:par>
+                    <p:cTn id="3" fill="hold">
+                      <p:stCondLst>
+                        <p:cond delay="indefinite"/>
+                      </p:stCondLst>
+                      <p:childTnLst>
+                        <p:par>
+                          <p:cTn id="4" fill="hold">
+                            <p:stCondLst>
+                              <p:cond delay="0"/>
+                            </p:stCondLst>
+                            <p:childTnLst>
+                              <p:par>
+                                <p:cTn id="5" presetID="10" presetClass="entr" presetSubtype="0" fill="hold" grpId="0" nodeType="clickEffect">
+                                  <p:stCondLst>
+                                    <p:cond delay="0"/>
+                                  </p:stCondLst>
+                                  <p:childTnLst>
+                                    <p:set>
+                                      <p:cBhvr>
+                                        <p:cTn id="6" dur="1" fill="hold">
+                                          <p:stCondLst>
+                                            <p:cond delay="0"/>
+                                          </p:stCondLst>
+                                        </p:cTn>
+                                        <p:tgtEl>
+                                          <p:spTgt spid="3">
+                                            <p:txEl>
+                                              <p:pRg st="0" end="0"/>
+                                            </p:txEl>
+                                          </p:spTgt>
+                                        </p:tgtEl>
+                                        <p:attrNameLst>
+                                          <p:attrName>style.visibility</p:attrName>
+                                        </p:attrNameLst>
+                                      </p:cBhvr>
+                                      <p:to>
+                                        <p:strVal val="visible"/>
+                                      </p:to>
+                                    </p:set>
+                                    <p:animEffect transition="in" filter="fade">
+                                      <p:cBhvr>
+                                        <p:cTn id="7" dur="500"/>
+                                        <p:tgtEl>
+                                          <p:spTgt spid="3">
+                                            <p:txEl>
+                                              <p:pRg st="0" end="0"/>
+                                            </p:txEl>
+                                          </p:spTgt>
+                                        </p:tgtEl>
+                                      </p:cBhvr>
+                                    </p:animEffect>
+                                  </p:childTnLst>
+                                </p:cTn>
+                              </p:par>
+                            </p:childTnLst>
+                          </p:cTn>
+                        </p:par>
+                      </p:childTnLst>
+                    </p:cTn>
+                  </p:par>
+                  <p:par>
+                    <p:cTn id="8" fill="hold">
+                      <p:stCondLst>
+                        <p:cond delay="indefinite"/>
+                      </p:stCondLst>
+                      <p:childTnLst>
+                        <p:par>
+                          <p:cTn id="9" fill="hold">
+                            <p:stCondLst>
+                              <p:cond delay="0"/>
+                            </p:stCondLst>
+                            <p:childTnLst>
+                              <p:par>
+                                <p:cTn id="10" presetID="10" presetClass="entr" presetSubtype="0" fill="hold" grpId="0" nodeType="clickEffect">
+                                  <p:stCondLst>
+                                    <p:cond delay="0"/>
+                                  </p:stCondLst>
+                                  <p:childTnLst>
+                                    <p:set>
+                                      <p:cBhvr>
+                                        <p:cTn id="11" dur="1" fill="hold">
+                                          <p:stCondLst>
+                                            <p:cond delay="0"/>
+                                          </p:stCondLst>
+                                        </p:cTn>
+                                        <p:tgtEl>
+                                          <p:spTgt spid="3">
+                                            <p:txEl>
+                                              <p:pRg st="1" end="1"/>
+                                            </p:txEl>
+                                          </p:spTgt>
+                                        </p:tgtEl>
+                                        <p:attrNameLst>
+                                          <p:attrName>style.visibility</p:attrName>
+                                        </p:attrNameLst>
+                                      </p:cBhvr>
+                                      <p:to>
+                                        <p:strVal val="visible"/>
+                                      </p:to>
+                                    </p:set>
+                                    <p:animEffect transition="in" filter="fade">
+                                      <p:cBhvr>
+                                        <p:cTn id="12" dur="500"/>
+                                        <p:tgtEl>
+                                          <p:spTgt spid="3">
+                                            <p:txEl>
+                                              <p:pRg st="1" end="1"/>
+                                            </p:txEl>
+                                          </p:spTgt>
+                                        </p:tgtEl>
+                                      </p:cBhvr>
+                                    </p:animEffect>
+                                  </p:childTnLst>
+                                </p:cTn>
+                              </p:par>
+                              <p:par>
+                                <p:cTn id="13" presetID="10" presetClass="entr" presetSubtype="0" fill="hold" grpId="0" nodeType="withEffect">
+                                  <p:stCondLst>
+                                    <p:cond delay="0"/>
+                                  </p:stCondLst>
+                                  <p:childTnLst>
+                                    <p:set>
+                                      <p:cBhvr>
+                                        <p:cTn id="14" dur="1" fill="hold">
+                                          <p:stCondLst>
+                                            <p:cond delay="0"/>
+                                          </p:stCondLst>
+                                        </p:cTn>
+                                        <p:tgtEl>
+                                          <p:spTgt spid="3">
+                                            <p:txEl>
+                                              <p:pRg st="2" end="2"/>
+                                            </p:txEl>
+                                          </p:spTgt>
+                                        </p:tgtEl>
+                                        <p:attrNameLst>
+                                          <p:attrName>style.visibility</p:attrName>
+                                        </p:attrNameLst>
+                                      </p:cBhvr>
+                                      <p:to>
+                                        <p:strVal val="visible"/>
+                                      </p:to>
+                                    </p:set>
+                                    <p:animEffect transition="in" filter="fade">
+                                      <p:cBhvr>
+                                        <p:cTn id="15" dur="500"/>
+                                        <p:tgtEl>
+                                          <p:spTgt spid="3">
+                                            <p:txEl>
+                                              <p:pRg st="2" end="2"/>
+                                            </p:txEl>
+                                          </p:spTgt>
+                                        </p:tgtEl>
+                                      </p:cBhvr>
+                                    </p:animEffect>
+                                  </p:childTnLst>
+                                </p:cTn>
+                              </p:par>
+                              <p:par>
+                                <p:cTn id="16" presetID="10" presetClass="entr" presetSubtype="0" fill="hold" grpId="0" nodeType="withEffect">
+                                  <p:stCondLst>
+                                    <p:cond delay="0"/>
+                                  </p:stCondLst>
+                                  <p:childTnLst>
+                                    <p:set>
+                                      <p:cBhvr>
+                                        <p:cTn id="17" dur="1" fill="hold">
+                                          <p:stCondLst>
+                                            <p:cond delay="0"/>
+                                          </p:stCondLst>
+                                        </p:cTn>
+                                        <p:tgtEl>
+                                          <p:spTgt spid="3">
+                                            <p:txEl>
+                                              <p:pRg st="3" end="3"/>
+                                            </p:txEl>
+                                          </p:spTgt>
+                                        </p:tgtEl>
+                                        <p:attrNameLst>
+                                          <p:attrName>style.visibility</p:attrName>
+                                        </p:attrNameLst>
+                                      </p:cBhvr>
+                                      <p:to>
+                                        <p:strVal val="visible"/>
+                                      </p:to>
+                                    </p:set>
+                                    <p:animEffect transition="in" filter="fade">
+                                      <p:cBhvr>
+                                        <p:cTn id="18" dur="500"/>
+                                        <p:tgtEl>
+                                          <p:spTgt spid="3">
+                                            <p:txEl>
+                                              <p:pRg st="3" end="3"/>
+                                            </p:txEl>
+                                          </p:spTgt>
+                                        </p:tgtEl>
+                                      </p:cBhvr>
+                                    </p:animEffect>
+                                  </p:childTnLst>
+                                </p:cTn>
+                              </p:par>
+                            </p:childTnLst>
+                          </p:cTn>
+                        </p:par>
+                      </p:childTnLst>
+                    </p:cTn>
+                  </p:par>
+                  <p:par>
+                    <p:cTn id="19" fill="hold">
+                      <p:stCondLst>
+                        <p:cond delay="indefinite"/>
+                      </p:stCondLst>
+                      <p:childTnLst>
+                        <p:par>
+                          <p:cTn id="20" fill="hold">
+                            <p:stCondLst>
+                              <p:cond delay="0"/>
+                            </p:stCondLst>
+                            <p:childTnLst>
+                              <p:par>
+                                <p:cTn id="21" presetID="10" presetClass="entr" presetSubtype="0" fill="hold" grpId="0" nodeType="clickEffect">
+                                  <p:stCondLst>
+                                    <p:cond delay="0"/>
+                                  </p:stCondLst>
+                                  <p:childTnLst>
+                                    <p:set>
+                                      <p:cBhvr>
+                                        <p:cTn id="22" dur="1" fill="hold">
+                                          <p:stCondLst>
+                                            <p:cond delay="0"/>
+                                          </p:stCondLst>
+                                        </p:cTn>
+                                        <p:tgtEl>
+                                          <p:spTgt spid="3">
+                                            <p:txEl>
+                                              <p:pRg st="4" end="4"/>
+                                            </p:txEl>
+                                          </p:spTgt>
+                                        </p:tgtEl>
+                                        <p:attrNameLst>
+                                          <p:attrName>style.visibility</p:attrName>
+                                        </p:attrNameLst>
+                                      </p:cBhvr>
+                                      <p:to>
+                                        <p:strVal val="visible"/>
+                                      </p:to>
+                                    </p:set>
+                                    <p:animEffect transition="in" filter="fade">
+                                      <p:cBhvr>
+                                        <p:cTn id="23" dur="500"/>
+                                        <p:tgtEl>
+                                          <p:spTgt spid="3">
+                                            <p:txEl>
+                                              <p:pRg st="4" end="4"/>
+                                            </p:txEl>
+                                          </p:spTgt>
+                                        </p:tgtEl>
+                                      </p:cBhvr>
+                                    </p:animEffect>
+                                  </p:childTnLst>
+                                </p:cTn>
+                              </p:par>
+                              <p:par>
+                                <p:cTn id="24" presetID="10" presetClass="entr" presetSubtype="0" fill="hold" grpId="0" nodeType="withEffect">
+                                  <p:stCondLst>
+                                    <p:cond delay="0"/>
+                                  </p:stCondLst>
+                                  <p:childTnLst>
+                                    <p:set>
+                                      <p:cBhvr>
+                                        <p:cTn id="25" dur="1" fill="hold">
+                                          <p:stCondLst>
+                                            <p:cond delay="0"/>
+                                          </p:stCondLst>
+                                        </p:cTn>
+                                        <p:tgtEl>
+                                          <p:spTgt spid="3">
+                                            <p:txEl>
+                                              <p:pRg st="5" end="5"/>
+                                            </p:txEl>
+                                          </p:spTgt>
+                                        </p:tgtEl>
+                                        <p:attrNameLst>
+                                          <p:attrName>style.visibility</p:attrName>
+                                        </p:attrNameLst>
+                                      </p:cBhvr>
+                                      <p:to>
+                                        <p:strVal val="visible"/>
+                                      </p:to>
+                                    </p:set>
+                                    <p:animEffect transition="in" filter="fade">
+                                      <p:cBhvr>
+                                        <p:cTn id="26" dur="500"/>
+                                        <p:tgtEl>
+                                          <p:spTgt spid="3">
+                                            <p:txEl>
+                                              <p:pRg st="5" end="5"/>
+                                            </p:txEl>
+                                          </p:spTgt>
+                                        </p:tgtEl>
+                                      </p:cBhvr>
+                                    </p:animEffect>
+                                  </p:childTnLst>
+                                </p:cTn>
+                              </p:par>
+                            </p:childTnLst>
+                          </p:cTn>
+                        </p:par>
+                      </p:childTnLst>
+                    </p:cTn>
+                  </p:par>
+                  <p:par>
+                    <p:cTn id="27" fill="hold">
+                      <p:stCondLst>
+                        <p:cond delay="indefinite"/>
+                      </p:stCondLst>
+                      <p:childTnLst>
+                        <p:par>
+                          <p:cTn id="28" fill="hold">
+                            <p:stCondLst>
+                              <p:cond delay="0"/>
+                            </p:stCondLst>
+                            <p:childTnLst>
+                              <p:par>
+                                <p:cTn id="29" presetID="10" presetClass="entr" presetSubtype="0" fill="hold" grpId="0" nodeType="clickEffect">
+                                  <p:stCondLst>
+                                    <p:cond delay="0"/>
+                                  </p:stCondLst>
+                                  <p:childTnLst>
+                                    <p:set>
+                                      <p:cBhvr>
+                                        <p:cTn id="30" dur="1" fill="hold">
+                                          <p:stCondLst>
+                                            <p:cond delay="0"/>
+                                          </p:stCondLst>
+                                        </p:cTn>
+                                        <p:tgtEl>
+                                          <p:spTgt spid="4"/>
+                                        </p:tgtEl>
+                                        <p:attrNameLst>
+                                          <p:attrName>style.visibility</p:attrName>
+                                        </p:attrNameLst>
+                                      </p:cBhvr>
+                                      <p:to>
+                                        <p:strVal val="visible"/>
+                                      </p:to>
+                                    </p:set>
+                                    <p:animEffect transition="in" filter="fade">
+                                      <p:cBhvr>
+                                        <p:cTn id="31" dur="500"/>
+                                        <p:tgtEl>
+                                          <p:spTgt spid="4"/>
+                                        </p:tgtEl>
+                                      </p:cBhvr>
+                                    </p:animEffect>
+                                  </p:childTnLst>
+                                </p:cTn>
+                              </p:par>
+                            </p:childTnLst>
+                          </p:cTn>
+                        </p:par>
+                      </p:childTnLst>
+                    </p:cTn>
+                  </p:par>
+                </p:childTnLst>
+              </p:cTn>
+              <p:prevCondLst>
+                <p:cond evt="onPrev" delay="0">
+                  <p:tgtEl>
+                    <p:sldTgt/>
+                  </p:tgtEl>
+                </p:cond>
+              </p:prevCondLst>
+              <p:nextCondLst>
+                <p:cond evt="onNext" delay="0">
+                  <p:tgtEl>
+                    <p:sldTgt/>
+                  </p:tgtEl>
+                </p:cond>
+              </p:nextCondLst>
+            </p:seq>
+          </p:childTnLst>
+        </p:cTn>
       </p:par>
     </p:tnLst>
+    <p:bldLst>
+      <p:bldP spid="3" grpId="0" build="p"/>
+      <p:bldP spid="4" grpId="0"/>
+    </p:bldLst>
   </p:timing>
 </p:sld>
 </file>
@@ -19321,11 +19810,11 @@
   <p:clrMapOvr>
     <a:masterClrMapping/>
   </p:clrMapOvr>
-  <mc:AlternateContent xmlns:mc="http://schemas.openxmlformats.org/markup-compatibility/2006">
-    <mc:Choice xmlns:p14="http://schemas.microsoft.com/office/powerpoint/2010/main" Requires="p14">
+  <mc:AlternateContent xmlns:mc="http://schemas.openxmlformats.org/markup-compatibility/2006" xmlns:p14="http://schemas.microsoft.com/office/powerpoint/2010/main">
+    <mc:Choice Requires="p14">
       <p:transition spd="slow" p14:dur="2000"/>
     </mc:Choice>
-    <mc:Fallback>
+    <mc:Fallback xmlns="">
       <p:transition spd="slow"/>
     </mc:Fallback>
   </mc:AlternateContent>
@@ -19624,13 +20113,13 @@
   <p:clrMapOvr>
     <a:masterClrMapping/>
   </p:clrMapOvr>
-  <mc:AlternateContent xmlns:mc="http://schemas.openxmlformats.org/markup-compatibility/2006">
-    <mc:Choice xmlns:p14="http://schemas.microsoft.com/office/powerpoint/2010/main" Requires="p14">
+  <mc:AlternateContent xmlns:mc="http://schemas.openxmlformats.org/markup-compatibility/2006" xmlns:p14="http://schemas.microsoft.com/office/powerpoint/2010/main">
+    <mc:Choice Requires="p14">
       <p:transition spd="med" p14:dur="700">
         <p:fade/>
       </p:transition>
     </mc:Choice>
-    <mc:Fallback>
+    <mc:Fallback xmlns="">
       <p:transition spd="med">
         <p:fade/>
       </p:transition>
@@ -19734,6 +20223,13 @@
   <p:clrMapOvr>
     <a:masterClrMapping/>
   </p:clrMapOvr>
+  <p:timing>
+    <p:tnLst>
+      <p:par>
+        <p:cTn id="1" dur="indefinite" restart="never" nodeType="tmRoot"/>
+      </p:par>
+    </p:tnLst>
+  </p:timing>
 </p:sld>
 </file>
 
@@ -19803,14 +20299,14 @@
                 <a:gridCol w="5762625">
                   <a:extLst>
                     <a:ext uri="{9D8B030D-6E8A-4147-A177-3AD203B41FA5}">
-                      <a16:colId xmlns:a16="http://schemas.microsoft.com/office/drawing/2014/main" xmlns="" val="1632794655"/>
+                      <a16:colId xmlns="" xmlns:a16="http://schemas.microsoft.com/office/drawing/2014/main" val="1632794655"/>
                     </a:ext>
                   </a:extLst>
                 </a:gridCol>
                 <a:gridCol w="5762625">
                   <a:extLst>
                     <a:ext uri="{9D8B030D-6E8A-4147-A177-3AD203B41FA5}">
-                      <a16:colId xmlns:a16="http://schemas.microsoft.com/office/drawing/2014/main" xmlns="" val="2011313899"/>
+                      <a16:colId xmlns="" xmlns:a16="http://schemas.microsoft.com/office/drawing/2014/main" val="2011313899"/>
                     </a:ext>
                   </a:extLst>
                 </a:gridCol>
@@ -19845,7 +20341,7 @@
                 </a:tc>
                 <a:extLst>
                   <a:ext uri="{0D108BD9-81ED-4DB2-BD59-A6C34878D82A}">
-                    <a16:rowId xmlns:a16="http://schemas.microsoft.com/office/drawing/2014/main" xmlns="" val="1789177411"/>
+                    <a16:rowId xmlns="" xmlns:a16="http://schemas.microsoft.com/office/drawing/2014/main" val="1789177411"/>
                   </a:ext>
                 </a:extLst>
               </a:tr>
@@ -19905,7 +20401,7 @@
                 </a:tc>
                 <a:extLst>
                   <a:ext uri="{0D108BD9-81ED-4DB2-BD59-A6C34878D82A}">
-                    <a16:rowId xmlns:a16="http://schemas.microsoft.com/office/drawing/2014/main" xmlns="" val="3842815335"/>
+                    <a16:rowId xmlns="" xmlns:a16="http://schemas.microsoft.com/office/drawing/2014/main" val="3842815335"/>
                   </a:ext>
                 </a:extLst>
               </a:tr>
@@ -19972,7 +20468,7 @@
                 </a:tc>
                 <a:extLst>
                   <a:ext uri="{0D108BD9-81ED-4DB2-BD59-A6C34878D82A}">
-                    <a16:rowId xmlns:a16="http://schemas.microsoft.com/office/drawing/2014/main" xmlns="" val="321066646"/>
+                    <a16:rowId xmlns="" xmlns:a16="http://schemas.microsoft.com/office/drawing/2014/main" val="321066646"/>
                   </a:ext>
                 </a:extLst>
               </a:tr>
@@ -20070,7 +20566,7 @@
                 </a:tc>
                 <a:extLst>
                   <a:ext uri="{0D108BD9-81ED-4DB2-BD59-A6C34878D82A}">
-                    <a16:rowId xmlns:a16="http://schemas.microsoft.com/office/drawing/2014/main" xmlns="" val="3812060533"/>
+                    <a16:rowId xmlns="" xmlns:a16="http://schemas.microsoft.com/office/drawing/2014/main" val="3812060533"/>
                   </a:ext>
                 </a:extLst>
               </a:tr>
@@ -20088,11 +20584,11 @@
   <p:clrMapOvr>
     <a:masterClrMapping/>
   </p:clrMapOvr>
-  <mc:AlternateContent xmlns:mc="http://schemas.openxmlformats.org/markup-compatibility/2006">
-    <mc:Choice xmlns:p14="http://schemas.microsoft.com/office/powerpoint/2010/main" Requires="p14">
+  <mc:AlternateContent xmlns:mc="http://schemas.openxmlformats.org/markup-compatibility/2006" xmlns:p14="http://schemas.microsoft.com/office/powerpoint/2010/main">
+    <mc:Choice Requires="p14">
       <p:transition spd="slow" p14:dur="2000"/>
     </mc:Choice>
-    <mc:Fallback>
+    <mc:Fallback xmlns="">
       <p:transition spd="slow"/>
     </mc:Fallback>
   </mc:AlternateContent>
@@ -21565,15 +22061,6 @@
 </file>
 
 <file path=customXml/item1.xml><?xml version="1.0" encoding="utf-8"?>
-<?mso-contentType ?>
-<FormTemplates xmlns="http://schemas.microsoft.com/sharepoint/v3/contenttype/forms">
-  <Display>DocumentLibraryForm</Display>
-  <Edit>DocumentLibraryForm</Edit>
-  <New>DocumentLibraryForm</New>
-</FormTemplates>
-</file>
-
-<file path=customXml/item2.xml><?xml version="1.0" encoding="utf-8"?>
 <ct:contentTypeSchema xmlns:ct="http://schemas.microsoft.com/office/2006/metadata/contentType" xmlns:ma="http://schemas.microsoft.com/office/2006/metadata/properties/metaAttributes" ct:_="" ma:_="" ma:contentTypeName="Document" ma:contentTypeID="0x010100496889825850D44592AC5D2F43187AE4" ma:contentTypeVersion="5" ma:contentTypeDescription="Create a new document." ma:contentTypeScope="" ma:versionID="fde90edb5a63ba841bca516fd2abaf95">
   <xsd:schema xmlns:xsd="http://www.w3.org/2001/XMLSchema" xmlns:xs="http://www.w3.org/2001/XMLSchema" xmlns:p="http://schemas.microsoft.com/office/2006/metadata/properties" xmlns:ns1="http://schemas.microsoft.com/sharepoint/v3" xmlns:ns2="230e9df3-be65-4c73-a93b-d1236ebd677e" xmlns:ns3="27aa9422-7f1f-4c84-9cdf-302b1a67e513" targetNamespace="http://schemas.microsoft.com/office/2006/metadata/properties" ma:root="true" ma:fieldsID="5e7808ae941cc340dbe51a3031959734" ns1:_="" ns2:_="" ns3:_="">
     <xsd:import namespace="http://schemas.microsoft.com/sharepoint/v3"/>
@@ -21755,6 +22242,15 @@
 </ct:contentTypeSchema>
 </file>
 
+<file path=customXml/item2.xml><?xml version="1.0" encoding="utf-8"?>
+<?mso-contentType ?>
+<FormTemplates xmlns="http://schemas.microsoft.com/sharepoint/v3/contenttype/forms">
+  <Display>DocumentLibraryForm</Display>
+  <Edit>DocumentLibraryForm</Edit>
+  <New>DocumentLibraryForm</New>
+</FormTemplates>
+</file>
+
 <file path=customXml/item3.xml><?xml version="1.0" encoding="utf-8"?>
 <p:properties xmlns:p="http://schemas.microsoft.com/office/2006/metadata/properties" xmlns:xsi="http://www.w3.org/2001/XMLSchema-instance" xmlns:pc="http://schemas.microsoft.com/office/infopath/2007/PartnerControls">
   <documentManagement>
@@ -21769,14 +22265,6 @@
 </file>
 
 <file path=customXml/itemProps1.xml><?xml version="1.0" encoding="utf-8"?>
-<ds:datastoreItem xmlns:ds="http://schemas.openxmlformats.org/officeDocument/2006/customXml" ds:itemID="{B0CA13EC-1D3C-4D6F-8D1C-E8A452CFC79A}">
-  <ds:schemaRefs>
-    <ds:schemaRef ds:uri="http://schemas.microsoft.com/sharepoint/v3/contenttype/forms"/>
-  </ds:schemaRefs>
-</ds:datastoreItem>
-</file>
-
-<file path=customXml/itemProps2.xml><?xml version="1.0" encoding="utf-8"?>
 <ds:datastoreItem xmlns:ds="http://schemas.openxmlformats.org/officeDocument/2006/customXml" ds:itemID="{3253B29C-1CCD-4FE8-A1C4-023A0910DF96}">
   <ds:schemaRefs>
     <ds:schemaRef ds:uri="http://schemas.microsoft.com/office/2006/metadata/contentType"/>
@@ -21792,6 +22280,14 @@
     <ds:schemaRef ds:uri="http://purl.org/dc/elements/1.1/"/>
     <ds:schemaRef ds:uri="http://purl.org/dc/terms/"/>
     <ds:schemaRef ds:uri="http://schemas.microsoft.com/internal/obd"/>
+  </ds:schemaRefs>
+</ds:datastoreItem>
+</file>
+
+<file path=customXml/itemProps2.xml><?xml version="1.0" encoding="utf-8"?>
+<ds:datastoreItem xmlns:ds="http://schemas.openxmlformats.org/officeDocument/2006/customXml" ds:itemID="{B0CA13EC-1D3C-4D6F-8D1C-E8A452CFC79A}">
+  <ds:schemaRefs>
+    <ds:schemaRef ds:uri="http://schemas.microsoft.com/sharepoint/v3/contenttype/forms"/>
   </ds:schemaRefs>
 </ds:datastoreItem>
 </file>

</xml_diff>